<commit_message>
3/20 agenda notes update
</commit_message>
<xml_diff>
--- a/Agenda Materials/onedm-agenda-2023-03-20.pptx
+++ b/Agenda Materials/onedm-agenda-2023-03-20.pptx
@@ -7405,8 +7405,8 @@
         </p:nvSpPr>
         <p:spPr>
           <a:xfrm>
-            <a:off x="896052" y="1644870"/>
-            <a:ext cx="8176602" cy="4531488"/>
+            <a:off x="696355" y="1234966"/>
+            <a:ext cx="8176602" cy="4903075"/>
           </a:xfrm>
         </p:spPr>
         <p:txBody>
@@ -7443,7 +7443,33 @@
             <a:pPr lvl="1"/>
             <a:r>
               <a:rPr lang="en-US" sz="2000" dirty="0"/>
-              <a:t>Link and Relation implementations – from use cases</a:t>
+              <a:t>SDF Tooling – SDF Compact Representation - CB</a:t>
+            </a:r>
+          </a:p>
+          <a:p>
+            <a:pPr lvl="1"/>
+            <a:r>
+              <a:rPr lang="en-US" sz="2000" dirty="0"/>
+              <a:t>Link and Relation implementations – from use cases – MK </a:t>
+            </a:r>
+          </a:p>
+          <a:p>
+            <a:pPr lvl="1"/>
+            <a:r>
+              <a:rPr lang="en-US" sz="2000" dirty="0" err="1"/>
+              <a:t>sdfChoice</a:t>
+            </a:r>
+            <a:r>
+              <a:rPr lang="en-US" sz="2000" dirty="0"/>
+              <a:t> modeling LWM2M </a:t>
+            </a:r>
+            <a:r>
+              <a:rPr lang="en-US" sz="2000" dirty="0" err="1"/>
+              <a:t>enums</a:t>
+            </a:r>
+            <a:r>
+              <a:rPr lang="en-US" sz="2000" dirty="0"/>
+              <a:t> - AK</a:t>
             </a:r>
           </a:p>
           <a:p>
@@ -7466,7 +7492,7 @@
             </a:r>
             <a:r>
               <a:rPr lang="en-US" sz="2000" dirty="0"/>
-              <a:t> gap</a:t>
+              <a:t> gap – MK </a:t>
             </a:r>
           </a:p>
           <a:p>
@@ -7483,7 +7509,18 @@
             </a:r>
             <a:r>
               <a:rPr lang="en-GB" sz="2000" dirty="0"/>
-              <a:t> </a:t>
+              <a:t> draft</a:t>
+            </a:r>
+          </a:p>
+          <a:p>
+            <a:pPr lvl="1"/>
+            <a:r>
+              <a:rPr lang="en-GB" sz="2000" dirty="0" err="1"/>
+              <a:t>sdfRelation</a:t>
+            </a:r>
+            <a:r>
+              <a:rPr lang="en-GB" sz="2000" dirty="0"/>
+              <a:t> questions – writeable relations</a:t>
             </a:r>
           </a:p>
           <a:p>
@@ -7491,6 +7528,18 @@
             <a:r>
               <a:rPr lang="en-GB" sz="2000" dirty="0"/>
               <a:t>class vs relation</a:t>
+            </a:r>
+          </a:p>
+          <a:p>
+            <a:r>
+              <a:rPr lang="en-GB" sz="2400" dirty="0"/>
+              <a:t>Matter and Energy</a:t>
+            </a:r>
+          </a:p>
+          <a:p>
+            <a:r>
+              <a:rPr lang="en-GB" sz="2400" dirty="0"/>
+              <a:t>BT model auto conversion question – Mesh Data Models?</a:t>
             </a:r>
           </a:p>
           <a:p>

</xml_diff>